<commit_message>
corrections to NLP intro
</commit_message>
<xml_diff>
--- a/Presentations/NLP - Introduction.pptx
+++ b/Presentations/NLP - Introduction.pptx
@@ -317,7 +317,7 @@
             <a:fld id="{1D8BD707-D9CF-40AE-B4C6-C98DA3205C09}" type="datetimeFigureOut">
               <a:rPr lang="en-US" smtClean="0"/>
               <a:pPr/>
-              <a:t>12/9/2017</a:t>
+              <a:t>12/16/2017</a:t>
             </a:fld>
             <a:endParaRPr lang="en-US"/>
           </a:p>
@@ -484,7 +484,7 @@
             <a:fld id="{1D8BD707-D9CF-40AE-B4C6-C98DA3205C09}" type="datetimeFigureOut">
               <a:rPr lang="en-US" smtClean="0"/>
               <a:pPr/>
-              <a:t>12/9/2017</a:t>
+              <a:t>12/16/2017</a:t>
             </a:fld>
             <a:endParaRPr lang="en-US"/>
           </a:p>
@@ -661,7 +661,7 @@
             <a:fld id="{1D8BD707-D9CF-40AE-B4C6-C98DA3205C09}" type="datetimeFigureOut">
               <a:rPr lang="en-US" smtClean="0"/>
               <a:pPr/>
-              <a:t>12/9/2017</a:t>
+              <a:t>12/16/2017</a:t>
             </a:fld>
             <a:endParaRPr lang="en-US"/>
           </a:p>
@@ -828,7 +828,7 @@
             <a:fld id="{1D8BD707-D9CF-40AE-B4C6-C98DA3205C09}" type="datetimeFigureOut">
               <a:rPr lang="en-US" smtClean="0"/>
               <a:pPr/>
-              <a:t>12/9/2017</a:t>
+              <a:t>12/16/2017</a:t>
             </a:fld>
             <a:endParaRPr lang="en-US"/>
           </a:p>
@@ -1071,7 +1071,7 @@
             <a:fld id="{1D8BD707-D9CF-40AE-B4C6-C98DA3205C09}" type="datetimeFigureOut">
               <a:rPr lang="en-US" smtClean="0"/>
               <a:pPr/>
-              <a:t>12/9/2017</a:t>
+              <a:t>12/16/2017</a:t>
             </a:fld>
             <a:endParaRPr lang="en-US"/>
           </a:p>
@@ -1356,7 +1356,7 @@
             <a:fld id="{1D8BD707-D9CF-40AE-B4C6-C98DA3205C09}" type="datetimeFigureOut">
               <a:rPr lang="en-US" smtClean="0"/>
               <a:pPr/>
-              <a:t>12/9/2017</a:t>
+              <a:t>12/16/2017</a:t>
             </a:fld>
             <a:endParaRPr lang="en-US"/>
           </a:p>
@@ -1775,7 +1775,7 @@
             <a:fld id="{1D8BD707-D9CF-40AE-B4C6-C98DA3205C09}" type="datetimeFigureOut">
               <a:rPr lang="en-US" smtClean="0"/>
               <a:pPr/>
-              <a:t>12/9/2017</a:t>
+              <a:t>12/16/2017</a:t>
             </a:fld>
             <a:endParaRPr lang="en-US"/>
           </a:p>
@@ -1890,7 +1890,7 @@
             <a:fld id="{1D8BD707-D9CF-40AE-B4C6-C98DA3205C09}" type="datetimeFigureOut">
               <a:rPr lang="en-US" smtClean="0"/>
               <a:pPr/>
-              <a:t>12/9/2017</a:t>
+              <a:t>12/16/2017</a:t>
             </a:fld>
             <a:endParaRPr lang="en-US"/>
           </a:p>
@@ -1982,7 +1982,7 @@
             <a:fld id="{1D8BD707-D9CF-40AE-B4C6-C98DA3205C09}" type="datetimeFigureOut">
               <a:rPr lang="en-US" smtClean="0"/>
               <a:pPr/>
-              <a:t>12/9/2017</a:t>
+              <a:t>12/16/2017</a:t>
             </a:fld>
             <a:endParaRPr lang="en-US"/>
           </a:p>
@@ -2256,7 +2256,7 @@
             <a:fld id="{1D8BD707-D9CF-40AE-B4C6-C98DA3205C09}" type="datetimeFigureOut">
               <a:rPr lang="en-US" smtClean="0"/>
               <a:pPr/>
-              <a:t>12/9/2017</a:t>
+              <a:t>12/16/2017</a:t>
             </a:fld>
             <a:endParaRPr lang="en-US"/>
           </a:p>
@@ -2506,7 +2506,7 @@
             <a:fld id="{1D8BD707-D9CF-40AE-B4C6-C98DA3205C09}" type="datetimeFigureOut">
               <a:rPr lang="en-US" smtClean="0"/>
               <a:pPr/>
-              <a:t>12/9/2017</a:t>
+              <a:t>12/16/2017</a:t>
             </a:fld>
             <a:endParaRPr lang="en-US"/>
           </a:p>
@@ -2716,7 +2716,7 @@
             <a:fld id="{1D8BD707-D9CF-40AE-B4C6-C98DA3205C09}" type="datetimeFigureOut">
               <a:rPr lang="en-US" smtClean="0"/>
               <a:pPr/>
-              <a:t>12/9/2017</a:t>
+              <a:t>12/16/2017</a:t>
             </a:fld>
             <a:endParaRPr lang="en-US"/>
           </a:p>
@@ -3206,15 +3206,7 @@
             </a:br>
             <a:r>
               <a:rPr lang="en-US" sz="1800" dirty="0" smtClean="0"/>
-              <a:t>Dec</a:t>
-            </a:r>
-            <a:r>
-              <a:rPr lang="en-US" sz="1800" dirty="0" smtClean="0"/>
-              <a:t>, </a:t>
-            </a:r>
-            <a:r>
-              <a:rPr lang="en-US" sz="1800" dirty="0" smtClean="0"/>
-              <a:t>2017</a:t>
+              <a:t>Dec, 2017</a:t>
             </a:r>
             <a:endParaRPr lang="en-US" sz="1800" dirty="0"/>
           </a:p>
@@ -3633,11 +3625,7 @@
             </a:pPr>
             <a:r>
               <a:rPr lang="en-US" sz="2400" dirty="0" smtClean="0"/>
-              <a:t>Unordered List of </a:t>
-            </a:r>
-            <a:r>
-              <a:rPr lang="en-US" sz="2400" dirty="0" smtClean="0"/>
-              <a:t>Words.</a:t>
+              <a:t>Unordered List of Words.</a:t>
             </a:r>
             <a:endParaRPr lang="en-US" sz="2000" dirty="0" smtClean="0"/>
           </a:p>
@@ -5398,15 +5386,7 @@
                   <a:srgbClr val="0070C0"/>
                 </a:solidFill>
               </a:rPr>
-              <a:t>Remove </a:t>
-            </a:r>
-            <a:r>
-              <a:rPr lang="en-US" sz="2400" dirty="0" smtClean="0">
-                <a:solidFill>
-                  <a:srgbClr val="0070C0"/>
-                </a:solidFill>
-              </a:rPr>
-              <a:t>Highest Frequency Words (above upper threshold), and</a:t>
+              <a:t>Remove Highest Frequency Words (above upper threshold), and</a:t>
             </a:r>
           </a:p>
           <a:p>
@@ -5739,15 +5719,7 @@
                   <a:srgbClr val="0070C0"/>
                 </a:solidFill>
               </a:rPr>
-              <a:t>Well known predefined Stop Word Lists – most widely used is the Porter </a:t>
-            </a:r>
-            <a:r>
-              <a:rPr lang="en-US" sz="2000" b="1" dirty="0" smtClean="0">
-                <a:solidFill>
-                  <a:srgbClr val="0070C0"/>
-                </a:solidFill>
-              </a:rPr>
-              <a:t>List</a:t>
+              <a:t>Well known predefined Stop Word Lists – most widely used is the Porter List</a:t>
             </a:r>
           </a:p>
           <a:p>
@@ -6716,15 +6688,7 @@
                   <a:srgbClr val="0070C0"/>
                 </a:solidFill>
               </a:rPr>
-              <a:t>Stems are correct if word is not </a:t>
-            </a:r>
-            <a:r>
-              <a:rPr lang="en-US" sz="2400" dirty="0" smtClean="0">
-                <a:solidFill>
-                  <a:srgbClr val="0070C0"/>
-                </a:solidFill>
-              </a:rPr>
-              <a:t>exception to grammar ending rules, </a:t>
+              <a:t>Stems are correct if word is not exception to grammar ending rules, </a:t>
             </a:r>
             <a:br>
               <a:rPr lang="en-US" sz="2400" dirty="0" smtClean="0">
@@ -6739,31 +6703,7 @@
                   <a:srgbClr val="C00000"/>
                 </a:solidFill>
               </a:rPr>
-              <a:t>BUT </a:t>
-            </a:r>
-            <a:r>
-              <a:rPr lang="en-US" sz="2400" dirty="0" smtClean="0">
-                <a:solidFill>
-                  <a:srgbClr val="C00000"/>
-                </a:solidFill>
-              </a:rPr>
-              <a:t>incorrect </a:t>
-            </a:r>
-            <a:r>
-              <a:rPr lang="en-US" sz="2400" dirty="0" smtClean="0">
-                <a:solidFill>
-                  <a:srgbClr val="C00000"/>
-                </a:solidFill>
-              </a:rPr>
-              <a:t>when word </a:t>
-            </a:r>
-            <a:r>
-              <a:rPr lang="en-US" sz="2400" dirty="0" smtClean="0">
-                <a:solidFill>
-                  <a:srgbClr val="C00000"/>
-                </a:solidFill>
-              </a:rPr>
-              <a:t>is an exception.</a:t>
+              <a:t>BUT incorrect when word is an exception.</a:t>
             </a:r>
           </a:p>
           <a:p>
@@ -7368,67 +7308,35 @@
                   <a:srgbClr val="0070C0"/>
                 </a:solidFill>
               </a:rPr>
-              <a:t>Lemmatization </a:t>
-            </a:r>
+              <a:t>Lemmatization means reducing words to their root form, but</a:t>
+            </a:r>
+          </a:p>
+          <a:p>
             <a:r>
               <a:rPr lang="en-US" sz="2400" dirty="0" smtClean="0">
                 <a:solidFill>
                   <a:srgbClr val="0070C0"/>
                 </a:solidFill>
               </a:rPr>
-              <a:t>means reducing words to their root form, but</a:t>
-            </a:r>
-          </a:p>
-          <a:p>
+              <a:t>     correcting the exceptions by using a dictionary of common</a:t>
+            </a:r>
+          </a:p>
+          <a:p>
+            <a:r>
+              <a:rPr lang="en-US" sz="2400" dirty="0">
+                <a:solidFill>
+                  <a:srgbClr val="0070C0"/>
+                </a:solidFill>
+              </a:rPr>
+              <a:t> </a:t>
+            </a:r>
             <a:r>
               <a:rPr lang="en-US" sz="2400" dirty="0" smtClean="0">
                 <a:solidFill>
                   <a:srgbClr val="0070C0"/>
                 </a:solidFill>
               </a:rPr>
-              <a:t>     correcting the exceptions by using a dictionary of common</a:t>
-            </a:r>
-          </a:p>
-          <a:p>
-            <a:r>
-              <a:rPr lang="en-US" sz="2400" dirty="0">
-                <a:solidFill>
-                  <a:srgbClr val="0070C0"/>
-                </a:solidFill>
-              </a:rPr>
-              <a:t> </a:t>
-            </a:r>
-            <a:r>
-              <a:rPr lang="en-US" sz="2400" dirty="0" smtClean="0">
-                <a:solidFill>
-                  <a:srgbClr val="0070C0"/>
-                </a:solidFill>
-              </a:rPr>
-              <a:t>    </a:t>
-            </a:r>
-            <a:r>
-              <a:rPr lang="en-US" sz="2400" dirty="0" smtClean="0">
-                <a:solidFill>
-                  <a:srgbClr val="0070C0"/>
-                </a:solidFill>
-              </a:rPr>
-              <a:t>exceptions </a:t>
-            </a:r>
-            <a:r>
-              <a:rPr lang="en-US" sz="2400" dirty="0" smtClean="0">
-                <a:solidFill>
-                  <a:srgbClr val="0070C0"/>
-                </a:solidFill>
-              </a:rPr>
-              <a:t>(vs. all words, e.g., 1000 words instead of 100,000</a:t>
-            </a:r>
-            <a:r>
-              <a:rPr lang="en-US" sz="2400" dirty="0" smtClean="0">
-                <a:solidFill>
-                  <a:srgbClr val="0070C0"/>
-                </a:solidFill>
-              </a:rPr>
-              <a:t>).</a:t>
+              <a:t>    exceptions (vs. all words, e.g., 1000 words instead of 100,000).</a:t>
             </a:r>
             <a:endParaRPr lang="en-US" sz="2400" dirty="0">
               <a:solidFill>
@@ -7739,12 +7647,20 @@
               <a:t>= </a:t>
             </a:r>
             <a:r>
-              <a:rPr lang="nn-NO" sz="2000" dirty="0"/>
+              <a:rPr lang="nn-NO" sz="2000" smtClean="0"/>
               <a:t>[</a:t>
             </a:r>
             <a:r>
+              <a:rPr lang="nn-NO" sz="2000" smtClean="0"/>
+              <a:t>lemma.</a:t>
+            </a:r>
+            <a:r>
+              <a:rPr lang="nn-NO" sz="2000" smtClean="0"/>
+              <a:t>lemmatize(word</a:t>
+            </a:r>
+            <a:r>
               <a:rPr lang="nn-NO" sz="2000" dirty="0" smtClean="0"/>
-              <a:t>stemmer.stem(word) </a:t>
+              <a:t>) </a:t>
             </a:r>
             <a:r>
               <a:rPr lang="nn-NO" sz="2000" dirty="0">
@@ -7972,15 +7888,7 @@
                   <a:srgbClr val="0070C0"/>
                 </a:solidFill>
               </a:rPr>
-              <a:t>A collection of related documents</a:t>
-            </a:r>
-            <a:r>
-              <a:rPr lang="en-US" sz="2800" dirty="0" smtClean="0">
-                <a:solidFill>
-                  <a:srgbClr val="0070C0"/>
-                </a:solidFill>
-              </a:rPr>
-              <a:t>.</a:t>
+              <a:t>A collection of related documents.</a:t>
             </a:r>
             <a:br>
               <a:rPr lang="en-US" sz="2800" dirty="0" smtClean="0">
@@ -8120,17 +8028,7 @@
                   </a:schemeClr>
                 </a:solidFill>
               </a:rPr>
-              <a:t>      signature)</a:t>
-            </a:r>
-            <a:r>
-              <a:rPr lang="en-US" sz="2400" dirty="0" smtClean="0">
-                <a:solidFill>
-                  <a:schemeClr val="accent6">
-                    <a:lumMod val="75000"/>
-                  </a:schemeClr>
-                </a:solidFill>
-              </a:rPr>
-              <a:t>.</a:t>
+              <a:t>      signature).</a:t>
             </a:r>
           </a:p>
           <a:p>
@@ -8353,31 +8251,7 @@
                   <a:srgbClr val="0070C0"/>
                 </a:solidFill>
               </a:rPr>
-              <a:t>Make a pass through all the </a:t>
-            </a:r>
-            <a:r>
-              <a:rPr lang="en-US" sz="2400" dirty="0" smtClean="0">
-                <a:solidFill>
-                  <a:srgbClr val="0070C0"/>
-                </a:solidFill>
-              </a:rPr>
-              <a:t>documents in a corpus, building </a:t>
-            </a:r>
-            <a:r>
-              <a:rPr lang="en-US" sz="2400" dirty="0" smtClean="0">
-                <a:solidFill>
-                  <a:srgbClr val="0070C0"/>
-                </a:solidFill>
-              </a:rPr>
-              <a:t>a </a:t>
-            </a:r>
-            <a:r>
-              <a:rPr lang="en-US" sz="2400" dirty="0" smtClean="0">
-                <a:solidFill>
-                  <a:srgbClr val="0070C0"/>
-                </a:solidFill>
-              </a:rPr>
-              <a:t/>
+              <a:t>Make a pass through all the documents in a corpus, building a </a:t>
             </a:r>
             <a:br>
               <a:rPr lang="en-US" sz="2400" dirty="0" smtClean="0">
@@ -8392,15 +8266,7 @@
                   <a:srgbClr val="0070C0"/>
                 </a:solidFill>
               </a:rPr>
-              <a:t>dictionary</a:t>
-            </a:r>
-            <a:r>
-              <a:rPr lang="en-US" sz="2400" dirty="0" smtClean="0">
-                <a:solidFill>
-                  <a:srgbClr val="0070C0"/>
-                </a:solidFill>
-              </a:rPr>
-              <a:t>.</a:t>
+              <a:t>dictionary.</a:t>
             </a:r>
           </a:p>
           <a:p>
@@ -9443,44 +9309,6 @@
           </a:p>
         </p:txBody>
       </p:sp>
-      <p:cxnSp>
-        <p:nvCxnSpPr>
-          <p:cNvPr id="20" name="Curved Connector 19"/>
-          <p:cNvCxnSpPr/>
-          <p:nvPr/>
-        </p:nvCxnSpPr>
-        <p:spPr>
-          <a:xfrm rot="10800000" flipV="1">
-            <a:off x="5892801" y="2264776"/>
-            <a:ext cx="474909" cy="249823"/>
-          </a:xfrm>
-          <a:prstGeom prst="curvedConnector3">
-            <a:avLst/>
-          </a:prstGeom>
-          <a:ln>
-            <a:solidFill>
-              <a:schemeClr val="accent6">
-                <a:lumMod val="75000"/>
-              </a:schemeClr>
-            </a:solidFill>
-            <a:tailEnd type="arrow"/>
-          </a:ln>
-        </p:spPr>
-        <p:style>
-          <a:lnRef idx="1">
-            <a:schemeClr val="accent1"/>
-          </a:lnRef>
-          <a:fillRef idx="0">
-            <a:schemeClr val="accent1"/>
-          </a:fillRef>
-          <a:effectRef idx="0">
-            <a:schemeClr val="accent1"/>
-          </a:effectRef>
-          <a:fontRef idx="minor">
-            <a:schemeClr val="tx1"/>
-          </a:fontRef>
-        </p:style>
-      </p:cxnSp>
     </p:spTree>
     <p:extLst>
       <p:ext uri="{BB962C8B-B14F-4D97-AF65-F5344CB8AC3E}">
@@ -9671,7 +9499,17 @@
                   <a:srgbClr val="0070C0"/>
                 </a:solidFill>
               </a:rPr>
-              <a:t>Term </a:t>
+              <a:t>Term Frequency is weighting the frequency of the word</a:t>
+            </a:r>
+          </a:p>
+          <a:p>
+            <a:r>
+              <a:rPr lang="en-US" sz="2800" dirty="0">
+                <a:solidFill>
+                  <a:srgbClr val="0070C0"/>
+                </a:solidFill>
+              </a:rPr>
+              <a:t> </a:t>
             </a:r>
             <a:r>
               <a:rPr lang="en-US" sz="2800" dirty="0" smtClean="0">
@@ -9679,7 +9517,7 @@
                   <a:srgbClr val="0070C0"/>
                 </a:solidFill>
               </a:rPr>
-              <a:t>Frequency is weighting the frequency of the word</a:t>
+              <a:t>    in the corpus, and using the frequency as its feature</a:t>
             </a:r>
           </a:p>
           <a:p>
@@ -9697,33 +9535,7 @@
                   <a:srgbClr val="0070C0"/>
                 </a:solidFill>
               </a:rPr>
-              <a:t>    in the corpus, and using the frequency as its feature</a:t>
-            </a:r>
-          </a:p>
-          <a:p>
-            <a:r>
-              <a:rPr lang="en-US" sz="2800" dirty="0">
-                <a:solidFill>
-                  <a:srgbClr val="0070C0"/>
-                </a:solidFill>
-              </a:rPr>
-              <a:t> </a:t>
-            </a:r>
-            <a:r>
-              <a:rPr lang="en-US" sz="2800" dirty="0" smtClean="0">
-                <a:solidFill>
-                  <a:srgbClr val="0070C0"/>
-                </a:solidFill>
-              </a:rPr>
-              <a:t>    </a:t>
-            </a:r>
-            <a:r>
-              <a:rPr lang="en-US" sz="2800" dirty="0" smtClean="0">
-                <a:solidFill>
-                  <a:srgbClr val="0070C0"/>
-                </a:solidFill>
-              </a:rPr>
-              <a:t>value.</a:t>
+              <a:t>    value.</a:t>
             </a:r>
           </a:p>
           <a:p>
@@ -9751,29 +9563,7 @@
                   </a:schemeClr>
                 </a:solidFill>
               </a:rPr>
-              <a:t>TF = (no</a:t>
-            </a:r>
-            <a:r>
-              <a:rPr lang="en-US" sz="2000" b="1" dirty="0" smtClean="0">
-                <a:solidFill>
-                  <a:schemeClr val="tx1">
-                    <a:lumMod val="95000"/>
-                    <a:lumOff val="5000"/>
-                  </a:schemeClr>
-                </a:solidFill>
-              </a:rPr>
-              <a:t>. of occurrences in corpus) / (no. of unique words in corpus</a:t>
-            </a:r>
-            <a:r>
-              <a:rPr lang="en-US" sz="2000" b="1" dirty="0" smtClean="0">
-                <a:solidFill>
-                  <a:schemeClr val="tx1">
-                    <a:lumMod val="95000"/>
-                    <a:lumOff val="5000"/>
-                  </a:schemeClr>
-                </a:solidFill>
-              </a:rPr>
-              <a:t>)</a:t>
+              <a:t>TF = (no. of occurrences in corpus) / (no. of unique words in corpus)</a:t>
             </a:r>
           </a:p>
           <a:p>
@@ -10265,7 +10055,17 @@
                   <a:srgbClr val="0070C0"/>
                 </a:solidFill>
               </a:rPr>
-              <a:t>Inverse </a:t>
+              <a:t>Inverse Document Frequency is weighting words by</a:t>
+            </a:r>
+          </a:p>
+          <a:p>
+            <a:r>
+              <a:rPr lang="en-US" sz="2800" dirty="0">
+                <a:solidFill>
+                  <a:srgbClr val="0070C0"/>
+                </a:solidFill>
+              </a:rPr>
+              <a:t> </a:t>
             </a:r>
             <a:r>
               <a:rPr lang="en-US" sz="2800" dirty="0" smtClean="0">
@@ -10273,57 +10073,7 @@
                   <a:srgbClr val="0070C0"/>
                 </a:solidFill>
               </a:rPr>
-              <a:t>Document Frequency is </a:t>
-            </a:r>
-            <a:r>
-              <a:rPr lang="en-US" sz="2800" dirty="0" smtClean="0">
-                <a:solidFill>
-                  <a:srgbClr val="0070C0"/>
-                </a:solidFill>
-              </a:rPr>
-              <a:t>weighting </a:t>
-            </a:r>
-            <a:r>
-              <a:rPr lang="en-US" sz="2800" dirty="0" smtClean="0">
-                <a:solidFill>
-                  <a:srgbClr val="0070C0"/>
-                </a:solidFill>
-              </a:rPr>
-              <a:t>words by</a:t>
-            </a:r>
-          </a:p>
-          <a:p>
-            <a:r>
-              <a:rPr lang="en-US" sz="2800" dirty="0">
-                <a:solidFill>
-                  <a:srgbClr val="0070C0"/>
-                </a:solidFill>
-              </a:rPr>
-              <a:t> </a:t>
-            </a:r>
-            <a:r>
-              <a:rPr lang="en-US" sz="2800" dirty="0" smtClean="0">
-                <a:solidFill>
-                  <a:srgbClr val="0070C0"/>
-                </a:solidFill>
-              </a:rPr>
-              <a:t>   </a:t>
-            </a:r>
-            <a:r>
-              <a:rPr lang="en-US" sz="2800" dirty="0" smtClean="0">
-                <a:solidFill>
-                  <a:srgbClr val="0070C0"/>
-                </a:solidFill>
-              </a:rPr>
-              <a:t>  have </a:t>
-            </a:r>
-            <a:r>
-              <a:rPr lang="en-US" sz="2800" dirty="0" smtClean="0">
-                <a:solidFill>
-                  <a:srgbClr val="0070C0"/>
-                </a:solidFill>
-              </a:rPr>
-              <a:t>rarely they appear in the corpus (assumption is </a:t>
+              <a:t>     have rarely they appear in the corpus (assumption is </a:t>
             </a:r>
             <a:br>
               <a:rPr lang="en-US" sz="2800" dirty="0" smtClean="0">
@@ -10338,23 +10088,7 @@
                   <a:srgbClr val="0070C0"/>
                 </a:solidFill>
               </a:rPr>
-              <a:t>    </a:t>
-            </a:r>
-            <a:r>
-              <a:rPr lang="en-US" sz="2800" dirty="0" smtClean="0">
-                <a:solidFill>
-                  <a:srgbClr val="0070C0"/>
-                </a:solidFill>
-              </a:rPr>
-              <a:t>  the </a:t>
-            </a:r>
-            <a:r>
-              <a:rPr lang="en-US" sz="2800" dirty="0" smtClean="0">
-                <a:solidFill>
-                  <a:srgbClr val="0070C0"/>
-                </a:solidFill>
-              </a:rPr>
-              <a:t>word is more significant in a document).</a:t>
+              <a:t>      the word is more significant in a document).</a:t>
             </a:r>
           </a:p>
           <a:p>
@@ -10374,10 +10108,10 @@
                   </a:schemeClr>
                 </a:solidFill>
               </a:rPr>
-              <a:t>    </a:t>
-            </a:r>
-            <a:r>
-              <a:rPr lang="en-US" sz="2000" b="1" dirty="0" smtClean="0">
+              <a:t>    IDF =  log (</a:t>
+            </a:r>
+            <a:r>
+              <a:rPr lang="en-US" sz="2000" b="1" dirty="0">
                 <a:solidFill>
                   <a:schemeClr val="tx1">
                     <a:lumMod val="95000"/>
@@ -10385,7 +10119,7 @@
                   </a:schemeClr>
                 </a:solidFill>
               </a:rPr>
-              <a:t>IDF =  </a:t>
+              <a:t>(no. of unique words in corpus</a:t>
             </a:r>
             <a:r>
               <a:rPr lang="en-US" sz="2000" b="1" dirty="0" smtClean="0">
@@ -10396,7 +10130,7 @@
                   </a:schemeClr>
                 </a:solidFill>
               </a:rPr>
-              <a:t>log (</a:t>
+              <a:t>) /</a:t>
             </a:r>
             <a:r>
               <a:rPr lang="en-US" sz="2000" b="1" dirty="0">
@@ -10407,7 +10141,7 @@
                   </a:schemeClr>
                 </a:solidFill>
               </a:rPr>
-              <a:t>(no. of unique words in corpus</a:t>
+              <a:t> (no. of occurrences in corpus)</a:t>
             </a:r>
             <a:r>
               <a:rPr lang="en-US" sz="2000" b="1" dirty="0" smtClean="0">
@@ -10418,40 +10152,7 @@
                   </a:schemeClr>
                 </a:solidFill>
               </a:rPr>
-              <a:t>) /</a:t>
-            </a:r>
-            <a:r>
-              <a:rPr lang="en-US" sz="2000" b="1" dirty="0">
-                <a:solidFill>
-                  <a:schemeClr val="tx1">
-                    <a:lumMod val="95000"/>
-                    <a:lumOff val="5000"/>
-                  </a:schemeClr>
-                </a:solidFill>
-              </a:rPr>
-              <a:t> (no. of occurrences in corpus)</a:t>
-            </a:r>
-            <a:r>
-              <a:rPr lang="en-US" sz="2000" b="1" dirty="0" smtClean="0">
-                <a:solidFill>
-                  <a:schemeClr val="tx1">
-                    <a:lumMod val="95000"/>
-                    <a:lumOff val="5000"/>
-                  </a:schemeClr>
-                </a:solidFill>
-              </a:rPr>
-              <a:t> </a:t>
-            </a:r>
-            <a:r>
-              <a:rPr lang="en-US" sz="2000" b="1" dirty="0" smtClean="0">
-                <a:solidFill>
-                  <a:schemeClr val="tx1">
-                    <a:lumMod val="95000"/>
-                    <a:lumOff val="5000"/>
-                  </a:schemeClr>
-                </a:solidFill>
-              </a:rPr>
-              <a:t>)</a:t>
+              <a:t> )</a:t>
             </a:r>
           </a:p>
           <a:p>
@@ -11252,11 +10953,7 @@
           <a:p>
             <a:r>
               <a:rPr lang="en-US" dirty="0" smtClean="0"/>
-              <a:t>parent </a:t>
-            </a:r>
-            <a:r>
-              <a:rPr lang="en-US" dirty="0" smtClean="0"/>
-              <a:t>  : 3</a:t>
+              <a:t>parent   : 3</a:t>
             </a:r>
             <a:r>
               <a:rPr lang="en-US" dirty="0"/>
@@ -11288,10 +10985,6 @@
               <a:rPr lang="en-US" dirty="0" smtClean="0"/>
               <a:t>      : 1</a:t>
             </a:r>
-            <a:r>
-              <a:rPr lang="en-US" dirty="0" smtClean="0"/>
-              <a:t/>
-            </a:r>
             <a:br>
               <a:rPr lang="en-US" dirty="0" smtClean="0"/>
             </a:br>
@@ -11299,24 +10992,12 @@
               <a:rPr lang="en-US" dirty="0" smtClean="0"/>
               <a:t>prepare: 1 </a:t>
             </a:r>
-            <a:r>
-              <a:rPr lang="en-US" dirty="0" smtClean="0"/>
-              <a:t/>
-            </a:r>
             <a:br>
               <a:rPr lang="en-US" dirty="0" smtClean="0"/>
             </a:br>
             <a:r>
               <a:rPr lang="en-US" dirty="0" smtClean="0"/>
-              <a:t>snack</a:t>
-            </a:r>
-            <a:r>
-              <a:rPr lang="en-US" dirty="0" smtClean="0"/>
-              <a:t>,   : 1</a:t>
-            </a:r>
-            <a:r>
-              <a:rPr lang="en-US" dirty="0" smtClean="0"/>
-              <a:t/>
+              <a:t>snack,   : 1</a:t>
             </a:r>
             <a:br>
               <a:rPr lang="en-US" dirty="0" smtClean="0"/>
@@ -11332,10 +11013,6 @@
             <a:r>
               <a:rPr lang="en-US" dirty="0" smtClean="0"/>
               <a:t>     : 1</a:t>
-            </a:r>
-            <a:r>
-              <a:rPr lang="en-US" dirty="0" smtClean="0"/>
-              <a:t/>
             </a:r>
             <a:br>
               <a:rPr lang="en-US" dirty="0" smtClean="0"/>
@@ -12397,90 +12074,37 @@
           <a:p>
             <a:r>
               <a:rPr lang="en-US" sz="2000" dirty="0" smtClean="0"/>
-              <a:t>[ quick</a:t>
-            </a:r>
+              <a:t>[ quick, brown ]</a:t>
+            </a:r>
+          </a:p>
+          <a:p>
             <a:r>
               <a:rPr lang="en-US" sz="2000" dirty="0" smtClean="0"/>
-              <a:t>, </a:t>
-            </a:r>
+              <a:t>[ brown, fox ]</a:t>
+            </a:r>
+          </a:p>
+          <a:p>
             <a:r>
               <a:rPr lang="en-US" sz="2000" dirty="0" smtClean="0"/>
-              <a:t>brown ]</a:t>
-            </a:r>
-            <a:endParaRPr lang="en-US" sz="2000" dirty="0" smtClean="0"/>
+              <a:t>[ fox, jump ]</a:t>
+            </a:r>
           </a:p>
           <a:p>
             <a:r>
               <a:rPr lang="en-US" sz="2000" dirty="0" smtClean="0"/>
-              <a:t>[ brown</a:t>
-            </a:r>
+              <a:t>[ jump, lazy ]</a:t>
+            </a:r>
+          </a:p>
+          <a:p>
             <a:r>
               <a:rPr lang="en-US" sz="2000" dirty="0" smtClean="0"/>
-              <a:t>, </a:t>
-            </a:r>
+              <a:t>[ lazy, dog ]</a:t>
+            </a:r>
+          </a:p>
+          <a:p>
             <a:r>
               <a:rPr lang="en-US" sz="2000" dirty="0" smtClean="0"/>
-              <a:t>fox ]</a:t>
-            </a:r>
-            <a:endParaRPr lang="en-US" sz="2000" dirty="0" smtClean="0"/>
-          </a:p>
-          <a:p>
-            <a:r>
-              <a:rPr lang="en-US" sz="2000" dirty="0" smtClean="0"/>
-              <a:t>[ fox</a:t>
-            </a:r>
-            <a:r>
-              <a:rPr lang="en-US" sz="2000" dirty="0" smtClean="0"/>
-              <a:t>, </a:t>
-            </a:r>
-            <a:r>
-              <a:rPr lang="en-US" sz="2000" dirty="0" smtClean="0"/>
-              <a:t>jump ]</a:t>
-            </a:r>
-            <a:endParaRPr lang="en-US" sz="2000" dirty="0" smtClean="0"/>
-          </a:p>
-          <a:p>
-            <a:r>
-              <a:rPr lang="en-US" sz="2000" dirty="0" smtClean="0"/>
-              <a:t>[ jump</a:t>
-            </a:r>
-            <a:r>
-              <a:rPr lang="en-US" sz="2000" dirty="0" smtClean="0"/>
-              <a:t>, </a:t>
-            </a:r>
-            <a:r>
-              <a:rPr lang="en-US" sz="2000" dirty="0" smtClean="0"/>
-              <a:t>lazy ]</a:t>
-            </a:r>
-            <a:endParaRPr lang="en-US" sz="2000" dirty="0" smtClean="0"/>
-          </a:p>
-          <a:p>
-            <a:r>
-              <a:rPr lang="en-US" sz="2000" dirty="0" smtClean="0"/>
-              <a:t>[ lazy</a:t>
-            </a:r>
-            <a:r>
-              <a:rPr lang="en-US" sz="2000" dirty="0" smtClean="0"/>
-              <a:t>, </a:t>
-            </a:r>
-            <a:r>
-              <a:rPr lang="en-US" sz="2000" dirty="0" smtClean="0"/>
-              <a:t>dog ]</a:t>
-            </a:r>
-            <a:endParaRPr lang="en-US" sz="2000" dirty="0" smtClean="0"/>
-          </a:p>
-          <a:p>
-            <a:r>
-              <a:rPr lang="en-US" sz="2000" dirty="0" smtClean="0"/>
-              <a:t>[ Dog</a:t>
-            </a:r>
-            <a:r>
-              <a:rPr lang="en-US" sz="2000" dirty="0" smtClean="0"/>
-              <a:t>, &lt;null</a:t>
-            </a:r>
-            <a:r>
-              <a:rPr lang="en-US" sz="2000" dirty="0" smtClean="0"/>
-              <a:t>&gt; ]</a:t>
+              <a:t>[ Dog, &lt;null&gt; ]</a:t>
             </a:r>
             <a:endParaRPr lang="en-US" sz="2000" dirty="0"/>
           </a:p>
@@ -12954,13 +12578,6 @@
               </a:rPr>
               <a:t>Constantly needs updating for new words.</a:t>
             </a:r>
-            <a:endParaRPr lang="en-US" sz="2400" dirty="0" smtClean="0">
-              <a:solidFill>
-                <a:schemeClr val="accent6">
-                  <a:lumMod val="75000"/>
-                </a:schemeClr>
-              </a:solidFill>
-            </a:endParaRPr>
           </a:p>
         </p:txBody>
       </p:sp>
@@ -14896,15 +14513,7 @@
                   <a:srgbClr val="0070C0"/>
                 </a:solidFill>
               </a:rPr>
-              <a:t>Machine l</a:t>
-            </a:r>
-            <a:r>
-              <a:rPr lang="en-US" sz="2800" dirty="0" smtClean="0">
-                <a:solidFill>
-                  <a:srgbClr val="0070C0"/>
-                </a:solidFill>
-              </a:rPr>
-              <a:t>earn the meaning of a word by the distribution of words around it. </a:t>
+              <a:t>Machine learn the meaning of a word by the distribution of words around it. </a:t>
             </a:r>
             <a:br>
               <a:rPr lang="en-US" sz="2800" dirty="0" smtClean="0">
@@ -14947,11 +14556,6 @@
               </a:rPr>
               <a:t>To learn the meaning of a word, find a large number of sentences with the word and calculate the distribution of words around it.</a:t>
             </a:r>
-            <a:endParaRPr lang="en-US" sz="2800" dirty="0" smtClean="0">
-              <a:solidFill>
-                <a:srgbClr val="0070C0"/>
-              </a:solidFill>
-            </a:endParaRPr>
           </a:p>
           <a:p>
             <a:pPr marL="0" indent="0">

</xml_diff>